<commit_message>
(feat) import and modify single elements
</commit_message>
<xml_diff>
--- a/__tests__/pptx-templates/SlideWithShapes.pptx
+++ b/__tests__/pptx-templates/SlideWithShapes.pptx
@@ -6,6 +6,7 @@
   </p:sldMasterIdLst>
   <p:sldIdLst>
     <p:sldId id="256" r:id="rId2"/>
+    <p:sldId id="257" r:id="rId3"/>
   </p:sldIdLst>
   <p:sldSz cx="12192000" cy="6858000"/>
   <p:notesSz cx="6858000" cy="9144000"/>
@@ -259,7 +260,7 @@
           <a:p>
             <a:fld id="{8FB60A0F-5ED1-45ED-A5D5-DB038E6B70D9}" type="datetimeFigureOut">
               <a:rPr lang="de-DE" smtClean="0"/>
-              <a:t>05.03.2021</a:t>
+              <a:t>11.03.2021</a:t>
             </a:fld>
             <a:endParaRPr lang="de-DE"/>
           </a:p>
@@ -457,7 +458,7 @@
           <a:p>
             <a:fld id="{8FB60A0F-5ED1-45ED-A5D5-DB038E6B70D9}" type="datetimeFigureOut">
               <a:rPr lang="de-DE" smtClean="0"/>
-              <a:t>05.03.2021</a:t>
+              <a:t>11.03.2021</a:t>
             </a:fld>
             <a:endParaRPr lang="de-DE"/>
           </a:p>
@@ -665,7 +666,7 @@
           <a:p>
             <a:fld id="{8FB60A0F-5ED1-45ED-A5D5-DB038E6B70D9}" type="datetimeFigureOut">
               <a:rPr lang="de-DE" smtClean="0"/>
-              <a:t>05.03.2021</a:t>
+              <a:t>11.03.2021</a:t>
             </a:fld>
             <a:endParaRPr lang="de-DE"/>
           </a:p>
@@ -863,7 +864,7 @@
           <a:p>
             <a:fld id="{8FB60A0F-5ED1-45ED-A5D5-DB038E6B70D9}" type="datetimeFigureOut">
               <a:rPr lang="de-DE" smtClean="0"/>
-              <a:t>05.03.2021</a:t>
+              <a:t>11.03.2021</a:t>
             </a:fld>
             <a:endParaRPr lang="de-DE"/>
           </a:p>
@@ -1138,7 +1139,7 @@
           <a:p>
             <a:fld id="{8FB60A0F-5ED1-45ED-A5D5-DB038E6B70D9}" type="datetimeFigureOut">
               <a:rPr lang="de-DE" smtClean="0"/>
-              <a:t>05.03.2021</a:t>
+              <a:t>11.03.2021</a:t>
             </a:fld>
             <a:endParaRPr lang="de-DE"/>
           </a:p>
@@ -1403,7 +1404,7 @@
           <a:p>
             <a:fld id="{8FB60A0F-5ED1-45ED-A5D5-DB038E6B70D9}" type="datetimeFigureOut">
               <a:rPr lang="de-DE" smtClean="0"/>
-              <a:t>05.03.2021</a:t>
+              <a:t>11.03.2021</a:t>
             </a:fld>
             <a:endParaRPr lang="de-DE"/>
           </a:p>
@@ -1815,7 +1816,7 @@
           <a:p>
             <a:fld id="{8FB60A0F-5ED1-45ED-A5D5-DB038E6B70D9}" type="datetimeFigureOut">
               <a:rPr lang="de-DE" smtClean="0"/>
-              <a:t>05.03.2021</a:t>
+              <a:t>11.03.2021</a:t>
             </a:fld>
             <a:endParaRPr lang="de-DE"/>
           </a:p>
@@ -1956,7 +1957,7 @@
           <a:p>
             <a:fld id="{8FB60A0F-5ED1-45ED-A5D5-DB038E6B70D9}" type="datetimeFigureOut">
               <a:rPr lang="de-DE" smtClean="0"/>
-              <a:t>05.03.2021</a:t>
+              <a:t>11.03.2021</a:t>
             </a:fld>
             <a:endParaRPr lang="de-DE"/>
           </a:p>
@@ -2069,7 +2070,7 @@
           <a:p>
             <a:fld id="{8FB60A0F-5ED1-45ED-A5D5-DB038E6B70D9}" type="datetimeFigureOut">
               <a:rPr lang="de-DE" smtClean="0"/>
-              <a:t>05.03.2021</a:t>
+              <a:t>11.03.2021</a:t>
             </a:fld>
             <a:endParaRPr lang="de-DE"/>
           </a:p>
@@ -2380,7 +2381,7 @@
           <a:p>
             <a:fld id="{8FB60A0F-5ED1-45ED-A5D5-DB038E6B70D9}" type="datetimeFigureOut">
               <a:rPr lang="de-DE" smtClean="0"/>
-              <a:t>05.03.2021</a:t>
+              <a:t>11.03.2021</a:t>
             </a:fld>
             <a:endParaRPr lang="de-DE"/>
           </a:p>
@@ -2668,7 +2669,7 @@
           <a:p>
             <a:fld id="{8FB60A0F-5ED1-45ED-A5D5-DB038E6B70D9}" type="datetimeFigureOut">
               <a:rPr lang="de-DE" smtClean="0"/>
-              <a:t>05.03.2021</a:t>
+              <a:t>11.03.2021</a:t>
             </a:fld>
             <a:endParaRPr lang="de-DE"/>
           </a:p>
@@ -2909,7 +2910,7 @@
           <a:p>
             <a:fld id="{8FB60A0F-5ED1-45ED-A5D5-DB038E6B70D9}" type="datetimeFigureOut">
               <a:rPr lang="de-DE" smtClean="0"/>
-              <a:t>05.03.2021</a:t>
+              <a:t>11.03.2021</a:t>
             </a:fld>
             <a:endParaRPr lang="de-DE"/>
           </a:p>
@@ -3384,7 +3385,7 @@
       </p:sp>
       <p:sp>
         <p:nvSpPr>
-          <p:cNvPr id="4" name="Wolke 3">
+          <p:cNvPr id="4" name="Cloud 1">
             <a:extLst>
               <a:ext uri="{FF2B5EF4-FFF2-40B4-BE49-F238E27FC236}">
                 <a16:creationId xmlns:a16="http://schemas.microsoft.com/office/drawing/2014/main" id="{B37A9009-27E0-43C3-8542-60F760C1FB47}"/>
@@ -3438,6 +3439,261 @@
     <p:extLst>
       <p:ext uri="{BB962C8B-B14F-4D97-AF65-F5344CB8AC3E}">
         <p14:creationId xmlns:p14="http://schemas.microsoft.com/office/powerpoint/2010/main" val="4167997312"/>
+      </p:ext>
+    </p:extLst>
+  </p:cSld>
+  <p:clrMapOvr>
+    <a:masterClrMapping/>
+  </p:clrMapOvr>
+</p:sld>
+</file>
+
+<file path=ppt/slides/slide2.xml><?xml version="1.0" encoding="utf-8"?>
+<p:sld xmlns:a="http://schemas.openxmlformats.org/drawingml/2006/main" xmlns:r="http://schemas.openxmlformats.org/officeDocument/2006/relationships" xmlns:p="http://schemas.openxmlformats.org/presentationml/2006/main">
+  <p:cSld>
+    <p:spTree>
+      <p:nvGrpSpPr>
+        <p:cNvPr id="1" name=""/>
+        <p:cNvGrpSpPr/>
+        <p:nvPr/>
+      </p:nvGrpSpPr>
+      <p:grpSpPr>
+        <a:xfrm>
+          <a:off x="0" y="0"/>
+          <a:ext cx="0" cy="0"/>
+          <a:chOff x="0" y="0"/>
+          <a:chExt cx="0" cy="0"/>
+        </a:xfrm>
+      </p:grpSpPr>
+      <p:sp>
+        <p:nvSpPr>
+          <p:cNvPr id="4" name="Cloud">
+            <a:extLst>
+              <a:ext uri="{FF2B5EF4-FFF2-40B4-BE49-F238E27FC236}">
+                <a16:creationId xmlns:a16="http://schemas.microsoft.com/office/drawing/2014/main" id="{B37A9009-27E0-43C3-8542-60F760C1FB47}"/>
+              </a:ext>
+            </a:extLst>
+          </p:cNvPr>
+          <p:cNvSpPr/>
+          <p:nvPr/>
+        </p:nvSpPr>
+        <p:spPr>
+          <a:xfrm>
+            <a:off x="3964136" y="2096030"/>
+            <a:ext cx="4387469" cy="2387600"/>
+          </a:xfrm>
+          <a:prstGeom prst="cloud">
+            <a:avLst/>
+          </a:prstGeom>
+          <a:solidFill>
+            <a:schemeClr val="accent5">
+              <a:lumMod val="20000"/>
+              <a:lumOff val="80000"/>
+            </a:schemeClr>
+          </a:solidFill>
+          <a:ln>
+            <a:noFill/>
+          </a:ln>
+        </p:spPr>
+        <p:style>
+          <a:lnRef idx="2">
+            <a:schemeClr val="accent1">
+              <a:shade val="50000"/>
+            </a:schemeClr>
+          </a:lnRef>
+          <a:fillRef idx="1">
+            <a:schemeClr val="accent1"/>
+          </a:fillRef>
+          <a:effectRef idx="0">
+            <a:schemeClr val="accent1"/>
+          </a:effectRef>
+          <a:fontRef idx="minor">
+            <a:schemeClr val="lt1"/>
+          </a:fontRef>
+        </p:style>
+        <p:txBody>
+          <a:bodyPr rtlCol="0" anchor="ctr"/>
+          <a:lstStyle/>
+          <a:p>
+            <a:pPr algn="ctr"/>
+            <a:r>
+              <a:rPr lang="de-DE" sz="3600">
+                <a:solidFill>
+                  <a:schemeClr val="accent1"/>
+                </a:solidFill>
+              </a:rPr>
+              <a:t>Default Text</a:t>
+            </a:r>
+          </a:p>
+        </p:txBody>
+      </p:sp>
+      <p:sp>
+        <p:nvSpPr>
+          <p:cNvPr id="5" name="Arrow">
+            <a:extLst>
+              <a:ext uri="{FF2B5EF4-FFF2-40B4-BE49-F238E27FC236}">
+                <a16:creationId xmlns:a16="http://schemas.microsoft.com/office/drawing/2014/main" id="{97EEE851-4797-491E-8D14-5FC9AD4A312C}"/>
+              </a:ext>
+            </a:extLst>
+          </p:cNvPr>
+          <p:cNvSpPr/>
+          <p:nvPr/>
+        </p:nvSpPr>
+        <p:spPr>
+          <a:xfrm>
+            <a:off x="835742" y="3046146"/>
+            <a:ext cx="1467191" cy="584200"/>
+          </a:xfrm>
+          <a:prstGeom prst="rightArrow">
+            <a:avLst/>
+          </a:prstGeom>
+          <a:solidFill>
+            <a:schemeClr val="accent2"/>
+          </a:solidFill>
+          <a:ln>
+            <a:noFill/>
+          </a:ln>
+        </p:spPr>
+        <p:style>
+          <a:lnRef idx="2">
+            <a:schemeClr val="accent1">
+              <a:shade val="50000"/>
+            </a:schemeClr>
+          </a:lnRef>
+          <a:fillRef idx="1">
+            <a:schemeClr val="accent1"/>
+          </a:fillRef>
+          <a:effectRef idx="0">
+            <a:schemeClr val="accent1"/>
+          </a:effectRef>
+          <a:fontRef idx="minor">
+            <a:schemeClr val="lt1"/>
+          </a:fontRef>
+        </p:style>
+        <p:txBody>
+          <a:bodyPr rtlCol="0" anchor="ctr"/>
+          <a:lstStyle/>
+          <a:p>
+            <a:pPr algn="ctr"/>
+            <a:r>
+              <a:rPr lang="de-DE"/>
+              <a:t>Arrow</a:t>
+            </a:r>
+          </a:p>
+        </p:txBody>
+      </p:sp>
+      <p:sp>
+        <p:nvSpPr>
+          <p:cNvPr id="6" name="Star">
+            <a:extLst>
+              <a:ext uri="{FF2B5EF4-FFF2-40B4-BE49-F238E27FC236}">
+                <a16:creationId xmlns:a16="http://schemas.microsoft.com/office/drawing/2014/main" id="{A6422CC1-D146-4A57-AC0E-B2547D3BFCF7}"/>
+              </a:ext>
+            </a:extLst>
+          </p:cNvPr>
+          <p:cNvSpPr/>
+          <p:nvPr/>
+        </p:nvSpPr>
+        <p:spPr>
+          <a:xfrm>
+            <a:off x="2556933" y="2769128"/>
+            <a:ext cx="1066800" cy="973667"/>
+          </a:xfrm>
+          <a:prstGeom prst="star5">
+            <a:avLst/>
+          </a:prstGeom>
+          <a:solidFill>
+            <a:schemeClr val="accent6"/>
+          </a:solidFill>
+          <a:ln>
+            <a:noFill/>
+          </a:ln>
+        </p:spPr>
+        <p:style>
+          <a:lnRef idx="2">
+            <a:schemeClr val="accent1">
+              <a:shade val="50000"/>
+            </a:schemeClr>
+          </a:lnRef>
+          <a:fillRef idx="1">
+            <a:schemeClr val="accent1"/>
+          </a:fillRef>
+          <a:effectRef idx="0">
+            <a:schemeClr val="accent1"/>
+          </a:effectRef>
+          <a:fontRef idx="minor">
+            <a:schemeClr val="lt1"/>
+          </a:fontRef>
+        </p:style>
+        <p:txBody>
+          <a:bodyPr rtlCol="0" anchor="ctr"/>
+          <a:lstStyle/>
+          <a:p>
+            <a:pPr algn="ctr"/>
+            <a:endParaRPr lang="de-DE"/>
+          </a:p>
+        </p:txBody>
+      </p:sp>
+      <p:sp>
+        <p:nvSpPr>
+          <p:cNvPr id="11" name="Drum">
+            <a:extLst>
+              <a:ext uri="{FF2B5EF4-FFF2-40B4-BE49-F238E27FC236}">
+                <a16:creationId xmlns:a16="http://schemas.microsoft.com/office/drawing/2014/main" id="{E43D12C3-AD5A-4317-BC00-FDED287C0BE8}"/>
+              </a:ext>
+            </a:extLst>
+          </p:cNvPr>
+          <p:cNvSpPr/>
+          <p:nvPr/>
+        </p:nvSpPr>
+        <p:spPr>
+          <a:xfrm>
+            <a:off x="9035845" y="2336101"/>
+            <a:ext cx="1661652" cy="1907458"/>
+          </a:xfrm>
+          <a:prstGeom prst="flowChartMagneticDisk">
+            <a:avLst/>
+          </a:prstGeom>
+          <a:solidFill>
+            <a:schemeClr val="bg2">
+              <a:lumMod val="90000"/>
+            </a:schemeClr>
+          </a:solidFill>
+          <a:ln>
+            <a:solidFill>
+              <a:schemeClr val="bg1"/>
+            </a:solidFill>
+          </a:ln>
+        </p:spPr>
+        <p:style>
+          <a:lnRef idx="2">
+            <a:schemeClr val="accent1">
+              <a:shade val="50000"/>
+            </a:schemeClr>
+          </a:lnRef>
+          <a:fillRef idx="1">
+            <a:schemeClr val="accent1"/>
+          </a:fillRef>
+          <a:effectRef idx="0">
+            <a:schemeClr val="accent1"/>
+          </a:effectRef>
+          <a:fontRef idx="minor">
+            <a:schemeClr val="lt1"/>
+          </a:fontRef>
+        </p:style>
+        <p:txBody>
+          <a:bodyPr rtlCol="0" anchor="ctr"/>
+          <a:lstStyle/>
+          <a:p>
+            <a:pPr algn="ctr"/>
+            <a:endParaRPr lang="de-DE"/>
+          </a:p>
+        </p:txBody>
+      </p:sp>
+    </p:spTree>
+    <p:extLst>
+      <p:ext uri="{BB962C8B-B14F-4D97-AF65-F5344CB8AC3E}">
+        <p14:creationId xmlns:p14="http://schemas.microsoft.com/office/powerpoint/2010/main" val="273148976"/>
       </p:ext>
     </p:extLst>
   </p:cSld>

</xml_diff>

<commit_message>
chore(slide): add getGroupInfo to ElementInfo to show if a shape is grouped or not
</commit_message>
<xml_diff>
--- a/__tests__/pptx-templates/SlideWithShapes.pptx
+++ b/__tests__/pptx-templates/SlideWithShapes.pptx
@@ -7,6 +7,7 @@
   <p:sldIdLst>
     <p:sldId id="256" r:id="rId2"/>
     <p:sldId id="257" r:id="rId3"/>
+    <p:sldId id="258" r:id="rId4"/>
   </p:sldIdLst>
   <p:sldSz cx="12192000" cy="6858000"/>
   <p:notesSz cx="6858000" cy="9144000"/>
@@ -260,7 +261,7 @@
           <a:p>
             <a:fld id="{8FB60A0F-5ED1-45ED-A5D5-DB038E6B70D9}" type="datetimeFigureOut">
               <a:rPr lang="de-DE" smtClean="0"/>
-              <a:t>11.03.2021</a:t>
+              <a:t>12.09.2025</a:t>
             </a:fld>
             <a:endParaRPr lang="de-DE"/>
           </a:p>
@@ -458,7 +459,7 @@
           <a:p>
             <a:fld id="{8FB60A0F-5ED1-45ED-A5D5-DB038E6B70D9}" type="datetimeFigureOut">
               <a:rPr lang="de-DE" smtClean="0"/>
-              <a:t>11.03.2021</a:t>
+              <a:t>12.09.2025</a:t>
             </a:fld>
             <a:endParaRPr lang="de-DE"/>
           </a:p>
@@ -666,7 +667,7 @@
           <a:p>
             <a:fld id="{8FB60A0F-5ED1-45ED-A5D5-DB038E6B70D9}" type="datetimeFigureOut">
               <a:rPr lang="de-DE" smtClean="0"/>
-              <a:t>11.03.2021</a:t>
+              <a:t>12.09.2025</a:t>
             </a:fld>
             <a:endParaRPr lang="de-DE"/>
           </a:p>
@@ -864,7 +865,7 @@
           <a:p>
             <a:fld id="{8FB60A0F-5ED1-45ED-A5D5-DB038E6B70D9}" type="datetimeFigureOut">
               <a:rPr lang="de-DE" smtClean="0"/>
-              <a:t>11.03.2021</a:t>
+              <a:t>12.09.2025</a:t>
             </a:fld>
             <a:endParaRPr lang="de-DE"/>
           </a:p>
@@ -1139,7 +1140,7 @@
           <a:p>
             <a:fld id="{8FB60A0F-5ED1-45ED-A5D5-DB038E6B70D9}" type="datetimeFigureOut">
               <a:rPr lang="de-DE" smtClean="0"/>
-              <a:t>11.03.2021</a:t>
+              <a:t>12.09.2025</a:t>
             </a:fld>
             <a:endParaRPr lang="de-DE"/>
           </a:p>
@@ -1404,7 +1405,7 @@
           <a:p>
             <a:fld id="{8FB60A0F-5ED1-45ED-A5D5-DB038E6B70D9}" type="datetimeFigureOut">
               <a:rPr lang="de-DE" smtClean="0"/>
-              <a:t>11.03.2021</a:t>
+              <a:t>12.09.2025</a:t>
             </a:fld>
             <a:endParaRPr lang="de-DE"/>
           </a:p>
@@ -1816,7 +1817,7 @@
           <a:p>
             <a:fld id="{8FB60A0F-5ED1-45ED-A5D5-DB038E6B70D9}" type="datetimeFigureOut">
               <a:rPr lang="de-DE" smtClean="0"/>
-              <a:t>11.03.2021</a:t>
+              <a:t>12.09.2025</a:t>
             </a:fld>
             <a:endParaRPr lang="de-DE"/>
           </a:p>
@@ -1957,7 +1958,7 @@
           <a:p>
             <a:fld id="{8FB60A0F-5ED1-45ED-A5D5-DB038E6B70D9}" type="datetimeFigureOut">
               <a:rPr lang="de-DE" smtClean="0"/>
-              <a:t>11.03.2021</a:t>
+              <a:t>12.09.2025</a:t>
             </a:fld>
             <a:endParaRPr lang="de-DE"/>
           </a:p>
@@ -2070,7 +2071,7 @@
           <a:p>
             <a:fld id="{8FB60A0F-5ED1-45ED-A5D5-DB038E6B70D9}" type="datetimeFigureOut">
               <a:rPr lang="de-DE" smtClean="0"/>
-              <a:t>11.03.2021</a:t>
+              <a:t>12.09.2025</a:t>
             </a:fld>
             <a:endParaRPr lang="de-DE"/>
           </a:p>
@@ -2381,7 +2382,7 @@
           <a:p>
             <a:fld id="{8FB60A0F-5ED1-45ED-A5D5-DB038E6B70D9}" type="datetimeFigureOut">
               <a:rPr lang="de-DE" smtClean="0"/>
-              <a:t>11.03.2021</a:t>
+              <a:t>12.09.2025</a:t>
             </a:fld>
             <a:endParaRPr lang="de-DE"/>
           </a:p>
@@ -2669,7 +2670,7 @@
           <a:p>
             <a:fld id="{8FB60A0F-5ED1-45ED-A5D5-DB038E6B70D9}" type="datetimeFigureOut">
               <a:rPr lang="de-DE" smtClean="0"/>
-              <a:t>11.03.2021</a:t>
+              <a:t>12.09.2025</a:t>
             </a:fld>
             <a:endParaRPr lang="de-DE"/>
           </a:p>
@@ -2910,7 +2911,7 @@
           <a:p>
             <a:fld id="{8FB60A0F-5ED1-45ED-A5D5-DB038E6B70D9}" type="datetimeFigureOut">
               <a:rPr lang="de-DE" smtClean="0"/>
-              <a:t>11.03.2021</a:t>
+              <a:t>12.09.2025</a:t>
             </a:fld>
             <a:endParaRPr lang="de-DE"/>
           </a:p>
@@ -3703,6 +3704,344 @@
 </p:sld>
 </file>
 
+<file path=ppt/slides/slide3.xml><?xml version="1.0" encoding="utf-8"?>
+<p:sld xmlns:a="http://schemas.openxmlformats.org/drawingml/2006/main" xmlns:r="http://schemas.openxmlformats.org/officeDocument/2006/relationships" xmlns:p="http://schemas.openxmlformats.org/presentationml/2006/main">
+  <p:cSld>
+    <p:spTree>
+      <p:nvGrpSpPr>
+        <p:cNvPr id="1" name=""/>
+        <p:cNvGrpSpPr/>
+        <p:nvPr/>
+      </p:nvGrpSpPr>
+      <p:grpSpPr>
+        <a:xfrm>
+          <a:off x="0" y="0"/>
+          <a:ext cx="0" cy="0"/>
+          <a:chOff x="0" y="0"/>
+          <a:chExt cx="0" cy="0"/>
+        </a:xfrm>
+      </p:grpSpPr>
+      <p:grpSp>
+        <p:nvGrpSpPr>
+          <p:cNvPr id="7" name="TopLevelGroup">
+            <a:extLst>
+              <a:ext uri="{FF2B5EF4-FFF2-40B4-BE49-F238E27FC236}">
+                <a16:creationId xmlns:a16="http://schemas.microsoft.com/office/drawing/2014/main" id="{A66CC6CC-F9F0-4CC6-83D1-C3C577E9F576}"/>
+              </a:ext>
+            </a:extLst>
+          </p:cNvPr>
+          <p:cNvGrpSpPr/>
+          <p:nvPr/>
+        </p:nvGrpSpPr>
+        <p:grpSpPr>
+          <a:xfrm>
+            <a:off x="3964136" y="2096030"/>
+            <a:ext cx="4387469" cy="3441774"/>
+            <a:chOff x="3964136" y="2096030"/>
+            <a:chExt cx="4387469" cy="3441774"/>
+          </a:xfrm>
+        </p:grpSpPr>
+        <p:sp>
+          <p:nvSpPr>
+            <p:cNvPr id="4" name="Cloud">
+              <a:extLst>
+                <a:ext uri="{FF2B5EF4-FFF2-40B4-BE49-F238E27FC236}">
+                  <a16:creationId xmlns:a16="http://schemas.microsoft.com/office/drawing/2014/main" id="{B37A9009-27E0-43C3-8542-60F760C1FB47}"/>
+                </a:ext>
+              </a:extLst>
+            </p:cNvPr>
+            <p:cNvSpPr/>
+            <p:nvPr/>
+          </p:nvSpPr>
+          <p:spPr>
+            <a:xfrm>
+              <a:off x="3964136" y="2096030"/>
+              <a:ext cx="4387469" cy="2387600"/>
+            </a:xfrm>
+            <a:prstGeom prst="cloud">
+              <a:avLst/>
+            </a:prstGeom>
+            <a:solidFill>
+              <a:schemeClr val="accent5">
+                <a:lumMod val="20000"/>
+                <a:lumOff val="80000"/>
+              </a:schemeClr>
+            </a:solidFill>
+            <a:ln>
+              <a:noFill/>
+            </a:ln>
+          </p:spPr>
+          <p:style>
+            <a:lnRef idx="2">
+              <a:schemeClr val="accent1">
+                <a:shade val="50000"/>
+              </a:schemeClr>
+            </a:lnRef>
+            <a:fillRef idx="1">
+              <a:schemeClr val="accent1"/>
+            </a:fillRef>
+            <a:effectRef idx="0">
+              <a:schemeClr val="accent1"/>
+            </a:effectRef>
+            <a:fontRef idx="minor">
+              <a:schemeClr val="lt1"/>
+            </a:fontRef>
+          </p:style>
+          <p:txBody>
+            <a:bodyPr rtlCol="0" anchor="ctr"/>
+            <a:lstStyle/>
+            <a:p>
+              <a:pPr algn="ctr"/>
+              <a:r>
+                <a:rPr lang="de-DE" sz="3600" dirty="0" err="1">
+                  <a:solidFill>
+                    <a:schemeClr val="accent1"/>
+                  </a:solidFill>
+                </a:rPr>
+                <a:t>Grouped</a:t>
+              </a:r>
+              <a:r>
+                <a:rPr lang="de-DE" sz="3600" dirty="0">
+                  <a:solidFill>
+                    <a:schemeClr val="accent1"/>
+                  </a:solidFill>
+                </a:rPr>
+                <a:t> Shapes</a:t>
+              </a:r>
+            </a:p>
+          </p:txBody>
+        </p:sp>
+        <p:grpSp>
+          <p:nvGrpSpPr>
+            <p:cNvPr id="2" name="Subgroup">
+              <a:extLst>
+                <a:ext uri="{FF2B5EF4-FFF2-40B4-BE49-F238E27FC236}">
+                  <a16:creationId xmlns:a16="http://schemas.microsoft.com/office/drawing/2014/main" id="{9B7264DC-ED0F-4BF8-9391-CC607BD83818}"/>
+                </a:ext>
+              </a:extLst>
+            </p:cNvPr>
+            <p:cNvGrpSpPr/>
+            <p:nvPr/>
+          </p:nvGrpSpPr>
+          <p:grpSpPr>
+            <a:xfrm>
+              <a:off x="3964136" y="3724277"/>
+              <a:ext cx="2451435" cy="1069105"/>
+              <a:chOff x="3964136" y="3724277"/>
+              <a:chExt cx="2451435" cy="1069105"/>
+            </a:xfrm>
+          </p:grpSpPr>
+          <p:sp>
+            <p:nvSpPr>
+              <p:cNvPr id="5" name="Arrow">
+                <a:extLst>
+                  <a:ext uri="{FF2B5EF4-FFF2-40B4-BE49-F238E27FC236}">
+                    <a16:creationId xmlns:a16="http://schemas.microsoft.com/office/drawing/2014/main" id="{97EEE851-4797-491E-8D14-5FC9AD4A312C}"/>
+                  </a:ext>
+                </a:extLst>
+              </p:cNvPr>
+              <p:cNvSpPr/>
+              <p:nvPr/>
+            </p:nvSpPr>
+            <p:spPr>
+              <a:xfrm>
+                <a:off x="3964136" y="3724277"/>
+                <a:ext cx="1467191" cy="584200"/>
+              </a:xfrm>
+              <a:prstGeom prst="rightArrow">
+                <a:avLst/>
+              </a:prstGeom>
+              <a:solidFill>
+                <a:schemeClr val="accent2"/>
+              </a:solidFill>
+              <a:ln>
+                <a:noFill/>
+              </a:ln>
+            </p:spPr>
+            <p:style>
+              <a:lnRef idx="2">
+                <a:schemeClr val="accent1">
+                  <a:shade val="50000"/>
+                </a:schemeClr>
+              </a:lnRef>
+              <a:fillRef idx="1">
+                <a:schemeClr val="accent1"/>
+              </a:fillRef>
+              <a:effectRef idx="0">
+                <a:schemeClr val="accent1"/>
+              </a:effectRef>
+              <a:fontRef idx="minor">
+                <a:schemeClr val="lt1"/>
+              </a:fontRef>
+            </p:style>
+            <p:txBody>
+              <a:bodyPr rtlCol="0" anchor="ctr"/>
+              <a:lstStyle/>
+              <a:p>
+                <a:pPr algn="ctr"/>
+                <a:r>
+                  <a:rPr lang="de-DE" dirty="0"/>
+                  <a:t>Arrow</a:t>
+                </a:r>
+              </a:p>
+            </p:txBody>
+          </p:sp>
+          <p:sp>
+            <p:nvSpPr>
+              <p:cNvPr id="6" name="Star">
+                <a:extLst>
+                  <a:ext uri="{FF2B5EF4-FFF2-40B4-BE49-F238E27FC236}">
+                    <a16:creationId xmlns:a16="http://schemas.microsoft.com/office/drawing/2014/main" id="{A6422CC1-D146-4A57-AC0E-B2547D3BFCF7}"/>
+                  </a:ext>
+                </a:extLst>
+              </p:cNvPr>
+              <p:cNvSpPr/>
+              <p:nvPr/>
+            </p:nvSpPr>
+            <p:spPr>
+              <a:xfrm>
+                <a:off x="5348771" y="3819715"/>
+                <a:ext cx="1066800" cy="973667"/>
+              </a:xfrm>
+              <a:prstGeom prst="star5">
+                <a:avLst/>
+              </a:prstGeom>
+              <a:solidFill>
+                <a:schemeClr val="accent6"/>
+              </a:solidFill>
+              <a:ln>
+                <a:noFill/>
+              </a:ln>
+            </p:spPr>
+            <p:style>
+              <a:lnRef idx="2">
+                <a:schemeClr val="accent1">
+                  <a:shade val="50000"/>
+                </a:schemeClr>
+              </a:lnRef>
+              <a:fillRef idx="1">
+                <a:schemeClr val="accent1"/>
+              </a:fillRef>
+              <a:effectRef idx="0">
+                <a:schemeClr val="accent1"/>
+              </a:effectRef>
+              <a:fontRef idx="minor">
+                <a:schemeClr val="lt1"/>
+              </a:fontRef>
+            </p:style>
+            <p:txBody>
+              <a:bodyPr rtlCol="0" anchor="ctr"/>
+              <a:lstStyle/>
+              <a:p>
+                <a:pPr algn="ctr"/>
+                <a:endParaRPr lang="de-DE"/>
+              </a:p>
+            </p:txBody>
+          </p:sp>
+        </p:grpSp>
+        <p:sp>
+          <p:nvSpPr>
+            <p:cNvPr id="11" name="Drum">
+              <a:extLst>
+                <a:ext uri="{FF2B5EF4-FFF2-40B4-BE49-F238E27FC236}">
+                  <a16:creationId xmlns:a16="http://schemas.microsoft.com/office/drawing/2014/main" id="{E43D12C3-AD5A-4317-BC00-FDED287C0BE8}"/>
+                </a:ext>
+              </a:extLst>
+            </p:cNvPr>
+            <p:cNvSpPr/>
+            <p:nvPr/>
+          </p:nvSpPr>
+          <p:spPr>
+            <a:xfrm>
+              <a:off x="6487198" y="3630346"/>
+              <a:ext cx="1661652" cy="1907458"/>
+            </a:xfrm>
+            <a:prstGeom prst="flowChartMagneticDisk">
+              <a:avLst/>
+            </a:prstGeom>
+            <a:solidFill>
+              <a:schemeClr val="bg2">
+                <a:lumMod val="90000"/>
+              </a:schemeClr>
+            </a:solidFill>
+            <a:ln>
+              <a:solidFill>
+                <a:schemeClr val="bg1"/>
+              </a:solidFill>
+            </a:ln>
+          </p:spPr>
+          <p:style>
+            <a:lnRef idx="2">
+              <a:schemeClr val="accent1">
+                <a:shade val="50000"/>
+              </a:schemeClr>
+            </a:lnRef>
+            <a:fillRef idx="1">
+              <a:schemeClr val="accent1"/>
+            </a:fillRef>
+            <a:effectRef idx="0">
+              <a:schemeClr val="accent1"/>
+            </a:effectRef>
+            <a:fontRef idx="minor">
+              <a:schemeClr val="lt1"/>
+            </a:fontRef>
+          </p:style>
+          <p:txBody>
+            <a:bodyPr rtlCol="0" anchor="ctr"/>
+            <a:lstStyle/>
+            <a:p>
+              <a:pPr algn="ctr"/>
+              <a:endParaRPr lang="de-DE" dirty="0"/>
+            </a:p>
+          </p:txBody>
+        </p:sp>
+      </p:grpSp>
+      <p:sp>
+        <p:nvSpPr>
+          <p:cNvPr id="8" name="Ungrouped shape">
+            <a:extLst>
+              <a:ext uri="{FF2B5EF4-FFF2-40B4-BE49-F238E27FC236}">
+                <a16:creationId xmlns:a16="http://schemas.microsoft.com/office/drawing/2014/main" id="{B65E9F17-3EE1-4EBA-8E54-53BDDED1EAE9}"/>
+              </a:ext>
+            </a:extLst>
+          </p:cNvPr>
+          <p:cNvSpPr>
+            <a:spLocks noGrp="1"/>
+          </p:cNvSpPr>
+          <p:nvPr>
+            <p:ph type="subTitle" idx="1"/>
+          </p:nvPr>
+        </p:nvSpPr>
+        <p:spPr>
+          <a:xfrm>
+            <a:off x="1524000" y="664285"/>
+            <a:ext cx="9144000" cy="584200"/>
+          </a:xfrm>
+        </p:spPr>
+        <p:txBody>
+          <a:bodyPr anchor="ctr"/>
+          <a:lstStyle/>
+          <a:p>
+            <a:r>
+              <a:rPr lang="de-DE"/>
+              <a:t>Slide</a:t>
+            </a:r>
+          </a:p>
+        </p:txBody>
+      </p:sp>
+    </p:spTree>
+    <p:extLst>
+      <p:ext uri="{BB962C8B-B14F-4D97-AF65-F5344CB8AC3E}">
+        <p14:creationId xmlns:p14="http://schemas.microsoft.com/office/powerpoint/2010/main" val="529222675"/>
+      </p:ext>
+    </p:extLst>
+  </p:cSld>
+  <p:clrMapOvr>
+    <a:masterClrMapping/>
+  </p:clrMapOvr>
+</p:sld>
+</file>
+
 <file path=ppt/theme/theme1.xml><?xml version="1.0" encoding="utf-8"?>
 <a:theme xmlns:a="http://schemas.openxmlformats.org/drawingml/2006/main" name="Office">
   <a:themeElements>

</xml_diff>